<commit_message>
final figures for paper
</commit_message>
<xml_diff>
--- a/figures/boltzmann-diff-temperature.pptx
+++ b/figures/boltzmann-diff-temperature.pptx
@@ -2,15 +2,16 @@
 <file path=ppt/presentation.xml><?xml version="1.0" encoding="utf-8"?>
 <p:presentation xmlns:a="http://schemas.openxmlformats.org/drawingml/2006/main" xmlns:r="http://schemas.openxmlformats.org/officeDocument/2006/relationships" xmlns:p="http://schemas.openxmlformats.org/presentationml/2006/main" saveSubsetFonts="1" autoCompressPictures="0">
   <p:sldMasterIdLst>
-    <p:sldMasterId id="2147483732" r:id="rId1"/>
+    <p:sldMasterId id="2147483780" r:id="rId1"/>
   </p:sldMasterIdLst>
   <p:notesMasterIdLst>
-    <p:notesMasterId r:id="rId3"/>
+    <p:notesMasterId r:id="rId4"/>
   </p:notesMasterIdLst>
   <p:sldIdLst>
     <p:sldId id="256" r:id="rId2"/>
+    <p:sldId id="257" r:id="rId3"/>
   </p:sldIdLst>
-  <p:sldSz cx="8229600" cy="9783763"/>
+  <p:sldSz cx="8229600" cy="6172200"/>
   <p:notesSz cx="6858000" cy="9144000"/>
   <p:defaultTextStyle>
     <a:defPPr>
@@ -197,7 +198,7 @@
           <a:p>
             <a:fld id="{4D654C45-5AD5-704B-88E2-7E702674D773}" type="datetimeFigureOut">
               <a:rPr lang="en-US" smtClean="0"/>
-              <a:t>5/16/17</a:t>
+              <a:t>5/18/17</a:t>
             </a:fld>
             <a:endParaRPr lang="en-US"/>
           </a:p>
@@ -215,8 +216,8 @@
         </p:nvSpPr>
         <p:spPr>
           <a:xfrm>
-            <a:off x="2130425" y="1143000"/>
-            <a:ext cx="2597150" cy="3086100"/>
+            <a:off x="1371600" y="1143000"/>
+            <a:ext cx="4114800" cy="3086100"/>
           </a:xfrm>
           <a:prstGeom prst="rect">
             <a:avLst/>
@@ -494,8 +495,8 @@
         </p:nvSpPr>
         <p:spPr>
           <a:xfrm>
-            <a:off x="617220" y="1601186"/>
-            <a:ext cx="6995160" cy="3406199"/>
+            <a:off x="617220" y="1010127"/>
+            <a:ext cx="6995160" cy="2148840"/>
           </a:xfrm>
         </p:spPr>
         <p:txBody>
@@ -526,8 +527,8 @@
         </p:nvSpPr>
         <p:spPr>
           <a:xfrm>
-            <a:off x="1028700" y="5138741"/>
-            <a:ext cx="6172200" cy="2362144"/>
+            <a:off x="1028700" y="3241834"/>
+            <a:ext cx="6172200" cy="1490186"/>
           </a:xfrm>
         </p:spPr>
         <p:txBody>
@@ -596,7 +597,7 @@
           <a:p>
             <a:fld id="{6BEE9317-30CC-7C49-B555-F232CBED8BD6}" type="datetimeFigureOut">
               <a:rPr lang="en-US" smtClean="0"/>
-              <a:t>5/16/17</a:t>
+              <a:t>5/18/17</a:t>
             </a:fld>
             <a:endParaRPr lang="en-US"/>
           </a:p>
@@ -761,7 +762,7 @@
           <a:p>
             <a:fld id="{6BEE9317-30CC-7C49-B555-F232CBED8BD6}" type="datetimeFigureOut">
               <a:rPr lang="en-US" smtClean="0"/>
-              <a:t>5/16/17</a:t>
+              <a:t>5/18/17</a:t>
             </a:fld>
             <a:endParaRPr lang="en-US"/>
           </a:p>
@@ -846,8 +847,8 @@
         </p:nvSpPr>
         <p:spPr>
           <a:xfrm>
-            <a:off x="5889308" y="520895"/>
-            <a:ext cx="1774508" cy="8291287"/>
+            <a:off x="5889308" y="328613"/>
+            <a:ext cx="1774508" cy="5230654"/>
           </a:xfrm>
         </p:spPr>
         <p:txBody>
@@ -874,8 +875,8 @@
         </p:nvSpPr>
         <p:spPr>
           <a:xfrm>
-            <a:off x="565785" y="520895"/>
-            <a:ext cx="5220653" cy="8291287"/>
+            <a:off x="565785" y="328613"/>
+            <a:ext cx="5220653" cy="5230654"/>
           </a:xfrm>
         </p:spPr>
         <p:txBody>
@@ -936,7 +937,7 @@
           <a:p>
             <a:fld id="{6BEE9317-30CC-7C49-B555-F232CBED8BD6}" type="datetimeFigureOut">
               <a:rPr lang="en-US" smtClean="0"/>
-              <a:t>5/16/17</a:t>
+              <a:t>5/18/17</a:t>
             </a:fld>
             <a:endParaRPr lang="en-US"/>
           </a:p>
@@ -1101,7 +1102,7 @@
           <a:p>
             <a:fld id="{6BEE9317-30CC-7C49-B555-F232CBED8BD6}" type="datetimeFigureOut">
               <a:rPr lang="en-US" smtClean="0"/>
-              <a:t>5/16/17</a:t>
+              <a:t>5/18/17</a:t>
             </a:fld>
             <a:endParaRPr lang="en-US"/>
           </a:p>
@@ -1186,8 +1187,8 @@
         </p:nvSpPr>
         <p:spPr>
           <a:xfrm>
-            <a:off x="561499" y="2439149"/>
-            <a:ext cx="7098030" cy="4069773"/>
+            <a:off x="561499" y="1538766"/>
+            <a:ext cx="7098030" cy="2567463"/>
           </a:xfrm>
         </p:spPr>
         <p:txBody>
@@ -1218,8 +1219,8 @@
         </p:nvSpPr>
         <p:spPr>
           <a:xfrm>
-            <a:off x="561499" y="6547424"/>
-            <a:ext cx="7098030" cy="2140197"/>
+            <a:off x="561499" y="4130518"/>
+            <a:ext cx="7098030" cy="1350168"/>
           </a:xfrm>
         </p:spPr>
         <p:txBody>
@@ -1340,7 +1341,7 @@
           <a:p>
             <a:fld id="{6BEE9317-30CC-7C49-B555-F232CBED8BD6}" type="datetimeFigureOut">
               <a:rPr lang="en-US" smtClean="0"/>
-              <a:t>5/16/17</a:t>
+              <a:t>5/18/17</a:t>
             </a:fld>
             <a:endParaRPr lang="en-US"/>
           </a:p>
@@ -1448,8 +1449,8 @@
         </p:nvSpPr>
         <p:spPr>
           <a:xfrm>
-            <a:off x="565785" y="2604474"/>
-            <a:ext cx="3497580" cy="6207708"/>
+            <a:off x="565785" y="1643063"/>
+            <a:ext cx="3497580" cy="3916204"/>
           </a:xfrm>
         </p:spPr>
         <p:txBody>
@@ -1505,8 +1506,8 @@
         </p:nvSpPr>
         <p:spPr>
           <a:xfrm>
-            <a:off x="4166235" y="2604474"/>
-            <a:ext cx="3497580" cy="6207708"/>
+            <a:off x="4166235" y="1643063"/>
+            <a:ext cx="3497580" cy="3916204"/>
           </a:xfrm>
         </p:spPr>
         <p:txBody>
@@ -1567,7 +1568,7 @@
           <a:p>
             <a:fld id="{6BEE9317-30CC-7C49-B555-F232CBED8BD6}" type="datetimeFigureOut">
               <a:rPr lang="en-US" smtClean="0"/>
-              <a:t>5/16/17</a:t>
+              <a:t>5/18/17</a:t>
             </a:fld>
             <a:endParaRPr lang="en-US"/>
           </a:p>
@@ -1652,8 +1653,8 @@
         </p:nvSpPr>
         <p:spPr>
           <a:xfrm>
-            <a:off x="566857" y="520897"/>
-            <a:ext cx="7098030" cy="1891075"/>
+            <a:off x="566857" y="328614"/>
+            <a:ext cx="7098030" cy="1193007"/>
           </a:xfrm>
         </p:spPr>
         <p:txBody>
@@ -1680,8 +1681,8 @@
         </p:nvSpPr>
         <p:spPr>
           <a:xfrm>
-            <a:off x="566858" y="2398381"/>
-            <a:ext cx="3481506" cy="1175410"/>
+            <a:off x="566858" y="1513047"/>
+            <a:ext cx="3481506" cy="741521"/>
           </a:xfrm>
         </p:spPr>
         <p:txBody>
@@ -1745,8 +1746,8 @@
         </p:nvSpPr>
         <p:spPr>
           <a:xfrm>
-            <a:off x="566858" y="3573791"/>
-            <a:ext cx="3481506" cy="5256509"/>
+            <a:off x="566858" y="2254568"/>
+            <a:ext cx="3481506" cy="3316129"/>
           </a:xfrm>
         </p:spPr>
         <p:txBody>
@@ -1802,8 +1803,8 @@
         </p:nvSpPr>
         <p:spPr>
           <a:xfrm>
-            <a:off x="4166235" y="2398381"/>
-            <a:ext cx="3498652" cy="1175410"/>
+            <a:off x="4166235" y="1513047"/>
+            <a:ext cx="3498652" cy="741521"/>
           </a:xfrm>
         </p:spPr>
         <p:txBody>
@@ -1867,8 +1868,8 @@
         </p:nvSpPr>
         <p:spPr>
           <a:xfrm>
-            <a:off x="4166235" y="3573791"/>
-            <a:ext cx="3498652" cy="5256509"/>
+            <a:off x="4166235" y="2254568"/>
+            <a:ext cx="3498652" cy="3316129"/>
           </a:xfrm>
         </p:spPr>
         <p:txBody>
@@ -1929,7 +1930,7 @@
           <a:p>
             <a:fld id="{6BEE9317-30CC-7C49-B555-F232CBED8BD6}" type="datetimeFigureOut">
               <a:rPr lang="en-US" smtClean="0"/>
-              <a:t>5/16/17</a:t>
+              <a:t>5/18/17</a:t>
             </a:fld>
             <a:endParaRPr lang="en-US"/>
           </a:p>
@@ -2042,7 +2043,7 @@
           <a:p>
             <a:fld id="{6BEE9317-30CC-7C49-B555-F232CBED8BD6}" type="datetimeFigureOut">
               <a:rPr lang="en-US" smtClean="0"/>
-              <a:t>5/16/17</a:t>
+              <a:t>5/18/17</a:t>
             </a:fld>
             <a:endParaRPr lang="en-US"/>
           </a:p>
@@ -2132,7 +2133,7 @@
           <a:p>
             <a:fld id="{6BEE9317-30CC-7C49-B555-F232CBED8BD6}" type="datetimeFigureOut">
               <a:rPr lang="en-US" smtClean="0"/>
-              <a:t>5/16/17</a:t>
+              <a:t>5/18/17</a:t>
             </a:fld>
             <a:endParaRPr lang="en-US"/>
           </a:p>
@@ -2217,8 +2218,8 @@
         </p:nvSpPr>
         <p:spPr>
           <a:xfrm>
-            <a:off x="566857" y="652251"/>
-            <a:ext cx="2654260" cy="2282878"/>
+            <a:off x="566857" y="411480"/>
+            <a:ext cx="2654260" cy="1440180"/>
           </a:xfrm>
         </p:spPr>
         <p:txBody>
@@ -2249,8 +2250,8 @@
         </p:nvSpPr>
         <p:spPr>
           <a:xfrm>
-            <a:off x="3498652" y="1408683"/>
-            <a:ext cx="4166235" cy="6952813"/>
+            <a:off x="3498652" y="888684"/>
+            <a:ext cx="4166235" cy="4386263"/>
           </a:xfrm>
         </p:spPr>
         <p:txBody>
@@ -2334,8 +2335,8 @@
         </p:nvSpPr>
         <p:spPr>
           <a:xfrm>
-            <a:off x="566857" y="2935129"/>
-            <a:ext cx="2654260" cy="5437689"/>
+            <a:off x="566857" y="1851660"/>
+            <a:ext cx="2654260" cy="3430429"/>
           </a:xfrm>
         </p:spPr>
         <p:txBody>
@@ -2404,7 +2405,7 @@
           <a:p>
             <a:fld id="{6BEE9317-30CC-7C49-B555-F232CBED8BD6}" type="datetimeFigureOut">
               <a:rPr lang="en-US" smtClean="0"/>
-              <a:t>5/16/17</a:t>
+              <a:t>5/18/17</a:t>
             </a:fld>
             <a:endParaRPr lang="en-US"/>
           </a:p>
@@ -2489,8 +2490,8 @@
         </p:nvSpPr>
         <p:spPr>
           <a:xfrm>
-            <a:off x="566857" y="652251"/>
-            <a:ext cx="2654260" cy="2282878"/>
+            <a:off x="566857" y="411480"/>
+            <a:ext cx="2654260" cy="1440180"/>
           </a:xfrm>
         </p:spPr>
         <p:txBody>
@@ -2521,8 +2522,8 @@
         </p:nvSpPr>
         <p:spPr>
           <a:xfrm>
-            <a:off x="3498652" y="1408683"/>
-            <a:ext cx="4166235" cy="6952813"/>
+            <a:off x="3498652" y="888684"/>
+            <a:ext cx="4166235" cy="4386263"/>
           </a:xfrm>
         </p:spPr>
         <p:txBody>
@@ -2586,8 +2587,8 @@
         </p:nvSpPr>
         <p:spPr>
           <a:xfrm>
-            <a:off x="566857" y="2935129"/>
-            <a:ext cx="2654260" cy="5437689"/>
+            <a:off x="566857" y="1851660"/>
+            <a:ext cx="2654260" cy="3430429"/>
           </a:xfrm>
         </p:spPr>
         <p:txBody>
@@ -2656,7 +2657,7 @@
           <a:p>
             <a:fld id="{6BEE9317-30CC-7C49-B555-F232CBED8BD6}" type="datetimeFigureOut">
               <a:rPr lang="en-US" smtClean="0"/>
-              <a:t>5/16/17</a:t>
+              <a:t>5/18/17</a:t>
             </a:fld>
             <a:endParaRPr lang="en-US"/>
           </a:p>
@@ -2746,8 +2747,8 @@
         </p:nvSpPr>
         <p:spPr>
           <a:xfrm>
-            <a:off x="565785" y="520897"/>
-            <a:ext cx="7098030" cy="1891075"/>
+            <a:off x="565785" y="328614"/>
+            <a:ext cx="7098030" cy="1193007"/>
           </a:xfrm>
           <a:prstGeom prst="rect">
             <a:avLst/>
@@ -2779,8 +2780,8 @@
         </p:nvSpPr>
         <p:spPr>
           <a:xfrm>
-            <a:off x="565785" y="2604474"/>
-            <a:ext cx="7098030" cy="6207708"/>
+            <a:off x="565785" y="1643063"/>
+            <a:ext cx="7098030" cy="3916204"/>
           </a:xfrm>
           <a:prstGeom prst="rect">
             <a:avLst/>
@@ -2841,8 +2842,8 @@
         </p:nvSpPr>
         <p:spPr>
           <a:xfrm>
-            <a:off x="565785" y="9068101"/>
-            <a:ext cx="1851660" cy="520895"/>
+            <a:off x="565785" y="5720716"/>
+            <a:ext cx="1851660" cy="328613"/>
           </a:xfrm>
           <a:prstGeom prst="rect">
             <a:avLst/>
@@ -2864,7 +2865,7 @@
           <a:p>
             <a:fld id="{6BEE9317-30CC-7C49-B555-F232CBED8BD6}" type="datetimeFigureOut">
               <a:rPr lang="en-US" smtClean="0"/>
-              <a:t>5/16/17</a:t>
+              <a:t>5/18/17</a:t>
             </a:fld>
             <a:endParaRPr lang="en-US"/>
           </a:p>
@@ -2882,8 +2883,8 @@
         </p:nvSpPr>
         <p:spPr>
           <a:xfrm>
-            <a:off x="2726055" y="9068101"/>
-            <a:ext cx="2777490" cy="520895"/>
+            <a:off x="2726055" y="5720716"/>
+            <a:ext cx="2777490" cy="328613"/>
           </a:xfrm>
           <a:prstGeom prst="rect">
             <a:avLst/>
@@ -2919,8 +2920,8 @@
         </p:nvSpPr>
         <p:spPr>
           <a:xfrm>
-            <a:off x="5812155" y="9068101"/>
-            <a:ext cx="1851660" cy="520895"/>
+            <a:off x="5812155" y="5720716"/>
+            <a:ext cx="1851660" cy="328613"/>
           </a:xfrm>
           <a:prstGeom prst="rect">
             <a:avLst/>
@@ -2951,23 +2952,23 @@
     </p:spTree>
     <p:extLst>
       <p:ext uri="{BB962C8B-B14F-4D97-AF65-F5344CB8AC3E}">
-        <p14:creationId xmlns:p14="http://schemas.microsoft.com/office/powerpoint/2010/main" val="1712644722"/>
+        <p14:creationId xmlns:p14="http://schemas.microsoft.com/office/powerpoint/2010/main" val="957964285"/>
       </p:ext>
     </p:extLst>
   </p:cSld>
   <p:clrMap bg1="lt1" tx1="dk1" bg2="lt2" tx2="dk2" accent1="accent1" accent2="accent2" accent3="accent3" accent4="accent4" accent5="accent5" accent6="accent6" hlink="hlink" folHlink="folHlink"/>
   <p:sldLayoutIdLst>
-    <p:sldLayoutId id="2147483733" r:id="rId1"/>
-    <p:sldLayoutId id="2147483734" r:id="rId2"/>
-    <p:sldLayoutId id="2147483735" r:id="rId3"/>
-    <p:sldLayoutId id="2147483736" r:id="rId4"/>
-    <p:sldLayoutId id="2147483737" r:id="rId5"/>
-    <p:sldLayoutId id="2147483738" r:id="rId6"/>
-    <p:sldLayoutId id="2147483739" r:id="rId7"/>
-    <p:sldLayoutId id="2147483740" r:id="rId8"/>
-    <p:sldLayoutId id="2147483741" r:id="rId9"/>
-    <p:sldLayoutId id="2147483742" r:id="rId10"/>
-    <p:sldLayoutId id="2147483743" r:id="rId11"/>
+    <p:sldLayoutId id="2147483781" r:id="rId1"/>
+    <p:sldLayoutId id="2147483782" r:id="rId2"/>
+    <p:sldLayoutId id="2147483783" r:id="rId3"/>
+    <p:sldLayoutId id="2147483784" r:id="rId4"/>
+    <p:sldLayoutId id="2147483785" r:id="rId5"/>
+    <p:sldLayoutId id="2147483786" r:id="rId6"/>
+    <p:sldLayoutId id="2147483787" r:id="rId7"/>
+    <p:sldLayoutId id="2147483788" r:id="rId8"/>
+    <p:sldLayoutId id="2147483789" r:id="rId9"/>
+    <p:sldLayoutId id="2147483790" r:id="rId10"/>
+    <p:sldLayoutId id="2147483791" r:id="rId11"/>
   </p:sldLayoutIdLst>
   <p:txStyles>
     <p:titleStyle>
@@ -3271,7 +3272,7 @@
       </p:grpSpPr>
       <p:pic>
         <p:nvPicPr>
-          <p:cNvPr id="6" name="Picture 5"/>
+          <p:cNvPr id="9" name="Picture 8"/>
           <p:cNvPicPr>
             <a:picLocks noChangeAspect="1"/>
           </p:cNvPicPr>
@@ -3291,8 +3292,8 @@
         </p:blipFill>
         <p:spPr>
           <a:xfrm>
-            <a:off x="123372" y="0"/>
-            <a:ext cx="7982857" cy="8980714"/>
+            <a:off x="0" y="81293"/>
+            <a:ext cx="8229600" cy="5985164"/>
           </a:xfrm>
           <a:prstGeom prst="rect">
             <a:avLst/>
@@ -3309,7 +3310,7 @@
             </p:nvSpPr>
             <p:spPr>
               <a:xfrm>
-                <a:off x="23739672" y="13985868"/>
+                <a:off x="23739672" y="10374305"/>
                 <a:ext cx="3396178" cy="1257717"/>
               </a:xfrm>
               <a:prstGeom prst="rect">
@@ -3489,7 +3490,341 @@
         </p:nvSpPr>
         <p:spPr>
           <a:xfrm>
-            <a:off x="1981493" y="9032447"/>
+            <a:off x="220435" y="2501025"/>
+            <a:ext cx="7788729" cy="430887"/>
+          </a:xfrm>
+          <a:prstGeom prst="rect">
+            <a:avLst/>
+          </a:prstGeom>
+          <a:noFill/>
+          <a:ln>
+            <a:noFill/>
+          </a:ln>
+        </p:spPr>
+        <p:txBody>
+          <a:bodyPr wrap="square" rtlCol="0">
+            <a:spAutoFit/>
+          </a:bodyPr>
+          <a:lstStyle/>
+          <a:p>
+            <a:pPr algn="ctr"/>
+            <a:r>
+              <a:rPr lang="en-US" sz="2200" dirty="0">
+                <a:latin typeface="Palatino" charset="0"/>
+                <a:ea typeface="Palatino" charset="0"/>
+                <a:cs typeface="Palatino" charset="0"/>
+              </a:rPr>
+              <a:t>(a</a:t>
+            </a:r>
+            <a:r>
+              <a:rPr lang="en-US" sz="2200" dirty="0">
+                <a:latin typeface="Palatino" charset="0"/>
+                <a:ea typeface="Palatino" charset="0"/>
+                <a:cs typeface="Palatino" charset="0"/>
+              </a:rPr>
+              <a:t>) Passive trajectory, active trajectory and beliefs for 𝛽 = 0.5</a:t>
+            </a:r>
+            <a:endParaRPr lang="en-US" sz="2200" dirty="0">
+              <a:latin typeface="Palatino" charset="0"/>
+              <a:ea typeface="Palatino" charset="0"/>
+              <a:cs typeface="Palatino" charset="0"/>
+            </a:endParaRPr>
+          </a:p>
+        </p:txBody>
+      </p:sp>
+      <p:sp>
+        <p:nvSpPr>
+          <p:cNvPr id="11" name="TextBox 10"/>
+          <p:cNvSpPr txBox="1"/>
+          <p:nvPr/>
+        </p:nvSpPr>
+        <p:spPr>
+          <a:xfrm>
+            <a:off x="220435" y="5749873"/>
+            <a:ext cx="7788729" cy="430887"/>
+          </a:xfrm>
+          <a:prstGeom prst="rect">
+            <a:avLst/>
+          </a:prstGeom>
+          <a:noFill/>
+          <a:ln>
+            <a:noFill/>
+          </a:ln>
+        </p:spPr>
+        <p:txBody>
+          <a:bodyPr wrap="square" rtlCol="0">
+            <a:spAutoFit/>
+          </a:bodyPr>
+          <a:lstStyle/>
+          <a:p>
+            <a:pPr algn="ctr"/>
+            <a:r>
+              <a:rPr lang="en-US" sz="2200" dirty="0">
+                <a:latin typeface="Palatino" charset="0"/>
+                <a:ea typeface="Palatino" charset="0"/>
+                <a:cs typeface="Palatino" charset="0"/>
+              </a:rPr>
+              <a:t>(b) Passive trajectory, active trajectory and beliefs for 𝛽 = 10.0</a:t>
+            </a:r>
+            <a:endParaRPr lang="en-US" sz="2200" dirty="0">
+              <a:latin typeface="Palatino" charset="0"/>
+              <a:ea typeface="Palatino" charset="0"/>
+              <a:cs typeface="Palatino" charset="0"/>
+            </a:endParaRPr>
+          </a:p>
+        </p:txBody>
+      </p:sp>
+    </p:spTree>
+    <p:extLst>
+      <p:ext uri="{BB962C8B-B14F-4D97-AF65-F5344CB8AC3E}">
+        <p14:creationId xmlns:p14="http://schemas.microsoft.com/office/powerpoint/2010/main" val="11426030"/>
+      </p:ext>
+    </p:extLst>
+  </p:cSld>
+  <p:clrMapOvr>
+    <a:masterClrMapping/>
+  </p:clrMapOvr>
+</p:sld>
+</file>
+
+<file path=ppt/slides/slide2.xml><?xml version="1.0" encoding="utf-8"?>
+<p:sld xmlns:a="http://schemas.openxmlformats.org/drawingml/2006/main" xmlns:r="http://schemas.openxmlformats.org/officeDocument/2006/relationships" xmlns:p="http://schemas.openxmlformats.org/presentationml/2006/main">
+  <p:cSld>
+    <p:spTree>
+      <p:nvGrpSpPr>
+        <p:cNvPr id="1" name=""/>
+        <p:cNvGrpSpPr/>
+        <p:nvPr/>
+      </p:nvGrpSpPr>
+      <p:grpSpPr>
+        <a:xfrm>
+          <a:off x="0" y="0"/>
+          <a:ext cx="0" cy="0"/>
+          <a:chOff x="0" y="0"/>
+          <a:chExt cx="0" cy="0"/>
+        </a:xfrm>
+      </p:grpSpPr>
+      <p:pic>
+        <p:nvPicPr>
+          <p:cNvPr id="6" name="Picture 5"/>
+          <p:cNvPicPr>
+            <a:picLocks noChangeAspect="1"/>
+          </p:cNvPicPr>
+          <p:nvPr/>
+        </p:nvPicPr>
+        <p:blipFill>
+          <a:blip r:embed="rId2">
+            <a:extLst>
+              <a:ext uri="{28A0092B-C50C-407E-A947-70E740481C1C}">
+                <a14:useLocalDpi xmlns:a14="http://schemas.microsoft.com/office/drawing/2010/main" val="0"/>
+              </a:ext>
+            </a:extLst>
+          </a:blip>
+          <a:stretch>
+            <a:fillRect/>
+          </a:stretch>
+        </p:blipFill>
+        <p:spPr>
+          <a:xfrm>
+            <a:off x="123376" y="-1805781"/>
+            <a:ext cx="7982857" cy="8980714"/>
+          </a:xfrm>
+          <a:prstGeom prst="rect">
+            <a:avLst/>
+          </a:prstGeom>
+        </p:spPr>
+      </p:pic>
+      <mc:AlternateContent xmlns:mc="http://schemas.openxmlformats.org/markup-compatibility/2006" xmlns:a14="http://schemas.microsoft.com/office/drawing/2010/main">
+        <mc:Choice Requires="a14">
+          <p:sp>
+            <p:nvSpPr>
+              <p:cNvPr id="5" name="TextBox 4"/>
+              <p:cNvSpPr txBox="1"/>
+              <p:nvPr/>
+            </p:nvSpPr>
+            <p:spPr>
+              <a:xfrm>
+                <a:off x="23739672" y="10374305"/>
+                <a:ext cx="3396178" cy="1257717"/>
+              </a:xfrm>
+              <a:prstGeom prst="rect">
+                <a:avLst/>
+              </a:prstGeom>
+              <a:noFill/>
+            </p:spPr>
+            <p:txBody>
+              <a:bodyPr wrap="square" rtlCol="0">
+                <a:spAutoFit/>
+              </a:bodyPr>
+              <a:lstStyle/>
+              <a:p>
+                <a:r>
+                  <a:rPr lang="en-US" sz="3745" i="1" dirty="0">
+                    <a:latin typeface="Palatino" charset="0"/>
+                    <a:ea typeface="Palatino" charset="0"/>
+                    <a:cs typeface="Palatino" charset="0"/>
+                  </a:rPr>
+                  <a:t>Maintain</a:t>
+                </a:r>
+                <a:r>
+                  <a:rPr lang="en-US" sz="3745" b="1" i="1" dirty="0">
+                    <a:latin typeface="Palatino" charset="0"/>
+                    <a:ea typeface="Palatino" charset="0"/>
+                    <a:cs typeface="Palatino" charset="0"/>
+                  </a:rPr>
+                  <a:t> </a:t>
+                </a:r>
+                <a:r>
+                  <a:rPr lang="en-US" sz="3745" dirty="0">
+                    <a:latin typeface="Palatino" charset="0"/>
+                    <a:ea typeface="Palatino" charset="0"/>
+                    <a:cs typeface="Palatino" charset="0"/>
+                  </a:rPr>
+                  <a:t>belief </a:t>
+                </a:r>
+              </a:p>
+              <a:p>
+                <a:pPr/>
+                <a14:m>
+                  <m:oMathPara xmlns:m="http://schemas.openxmlformats.org/officeDocument/2006/math">
+                    <m:oMathParaPr>
+                      <m:jc m:val="centerGroup"/>
+                    </m:oMathParaPr>
+                    <m:oMath xmlns:m="http://schemas.openxmlformats.org/officeDocument/2006/math">
+                      <m:r>
+                        <a:rPr lang="en-US" sz="3745" i="1">
+                          <a:latin typeface="Cambria Math" charset="0"/>
+                          <a:ea typeface="Palatino" charset="0"/>
+                          <a:cs typeface="Palatino" charset="0"/>
+                        </a:rPr>
+                        <m:t>𝑏</m:t>
+                      </m:r>
+                      <m:r>
+                        <a:rPr lang="en-US" sz="3745" i="1">
+                          <a:latin typeface="Cambria Math" charset="0"/>
+                          <a:ea typeface="Palatino" charset="0"/>
+                          <a:cs typeface="Palatino" charset="0"/>
+                        </a:rPr>
+                        <m:t>(</m:t>
+                      </m:r>
+                      <m:sSub>
+                        <m:sSubPr>
+                          <m:ctrlPr>
+                            <a:rPr lang="en-US" sz="3745" i="1">
+                              <a:latin typeface="Cambria Math" charset="0"/>
+                              <a:ea typeface="Palatino" charset="0"/>
+                              <a:cs typeface="Palatino" charset="0"/>
+                            </a:rPr>
+                          </m:ctrlPr>
+                        </m:sSubPr>
+                        <m:e>
+                          <m:r>
+                            <a:rPr lang="en-US" sz="3745" i="1">
+                              <a:latin typeface="Cambria Math" charset="0"/>
+                              <a:ea typeface="Palatino" charset="0"/>
+                              <a:cs typeface="Palatino" charset="0"/>
+                            </a:rPr>
+                            <m:t>𝜃</m:t>
+                          </m:r>
+                        </m:e>
+                        <m:sub>
+                          <m:r>
+                            <a:rPr lang="en-US" sz="3745" i="1">
+                              <a:latin typeface="Cambria Math" charset="0"/>
+                              <a:ea typeface="Palatino" charset="0"/>
+                              <a:cs typeface="Palatino" charset="0"/>
+                            </a:rPr>
+                            <m:t>𝐻</m:t>
+                          </m:r>
+                        </m:sub>
+                      </m:sSub>
+                      <m:r>
+                        <a:rPr lang="en-US" sz="3745" i="1">
+                          <a:latin typeface="Cambria Math" charset="0"/>
+                          <a:ea typeface="Palatino" charset="0"/>
+                          <a:cs typeface="Palatino" charset="0"/>
+                        </a:rPr>
+                        <m:t>=</m:t>
+                      </m:r>
+                      <m:r>
+                        <m:rPr>
+                          <m:nor/>
+                        </m:rPr>
+                        <a:rPr lang="en-US" sz="3745">
+                          <a:latin typeface="Palatino" charset="0"/>
+                          <a:ea typeface="Palatino" charset="0"/>
+                          <a:cs typeface="Palatino" charset="0"/>
+                        </a:rPr>
+                        <m:t>merge</m:t>
+                      </m:r>
+                      <m:r>
+                        <a:rPr lang="en-US" sz="3745" i="1">
+                          <a:latin typeface="Cambria Math" charset="0"/>
+                          <a:ea typeface="Palatino" charset="0"/>
+                          <a:cs typeface="Palatino" charset="0"/>
+                        </a:rPr>
+                        <m:t>)</m:t>
+                      </m:r>
+                    </m:oMath>
+                  </m:oMathPara>
+                </a14:m>
+                <a:endParaRPr lang="en-US" sz="3745" dirty="0">
+                  <a:latin typeface="Palatino" charset="0"/>
+                  <a:ea typeface="Palatino" charset="0"/>
+                  <a:cs typeface="Palatino" charset="0"/>
+                </a:endParaRPr>
+              </a:p>
+            </p:txBody>
+          </p:sp>
+        </mc:Choice>
+        <mc:Fallback xmlns="">
+          <p:sp>
+            <p:nvSpPr>
+              <p:cNvPr id="5" name="TextBox 4"/>
+              <p:cNvSpPr txBox="1">
+                <a:spLocks noRot="1" noChangeAspect="1" noMove="1" noResize="1" noEditPoints="1" noAdjustHandles="1" noChangeArrowheads="1" noChangeShapeType="1" noTextEdit="1"/>
+              </p:cNvSpPr>
+              <p:nvPr/>
+            </p:nvSpPr>
+            <p:spPr>
+              <a:xfrm>
+                <a:off x="19826292" y="6799462"/>
+                <a:ext cx="2539281" cy="963597"/>
+              </a:xfrm>
+              <a:prstGeom prst="rect">
+                <a:avLst/>
+              </a:prstGeom>
+              <a:blipFill rotWithShape="0">
+                <a:blip r:embed="rId3"/>
+                <a:stretch>
+                  <a:fillRect l="-4796" t="-6962" r="-3118"/>
+                </a:stretch>
+              </a:blipFill>
+            </p:spPr>
+            <p:txBody>
+              <a:bodyPr/>
+              <a:lstStyle/>
+              <a:p>
+                <a:r>
+                  <a:rPr lang="en-US">
+                    <a:noFill/>
+                  </a:rPr>
+                  <a:t> </a:t>
+                </a:r>
+              </a:p>
+            </p:txBody>
+          </p:sp>
+        </mc:Fallback>
+      </mc:AlternateContent>
+      <p:sp>
+        <p:nvSpPr>
+          <p:cNvPr id="22" name="TextBox 21"/>
+          <p:cNvSpPr txBox="1"/>
+          <p:nvPr/>
+        </p:nvSpPr>
+        <p:spPr>
+          <a:xfrm>
+            <a:off x="1981497" y="6655166"/>
             <a:ext cx="665667" cy="421654"/>
           </a:xfrm>
           <a:prstGeom prst="rect">
@@ -3523,7 +3858,7 @@
         </p:nvSpPr>
         <p:spPr>
           <a:xfrm>
-            <a:off x="6149610" y="9032447"/>
+            <a:off x="6149614" y="6655166"/>
             <a:ext cx="665667" cy="421654"/>
           </a:xfrm>
           <a:prstGeom prst="rect">
@@ -3549,10 +3884,40 @@
           </a:p>
         </p:txBody>
       </p:sp>
+      <p:pic>
+        <p:nvPicPr>
+          <p:cNvPr id="2" name="Picture 1"/>
+          <p:cNvPicPr>
+            <a:picLocks noChangeAspect="1"/>
+          </p:cNvPicPr>
+          <p:nvPr/>
+        </p:nvPicPr>
+        <p:blipFill>
+          <a:blip r:embed="rId4">
+            <a:extLst>
+              <a:ext uri="{28A0092B-C50C-407E-A947-70E740481C1C}">
+                <a14:useLocalDpi xmlns:a14="http://schemas.microsoft.com/office/drawing/2010/main" val="0"/>
+              </a:ext>
+            </a:extLst>
+          </a:blip>
+          <a:stretch>
+            <a:fillRect/>
+          </a:stretch>
+        </p:blipFill>
+        <p:spPr>
+          <a:xfrm>
+            <a:off x="0" y="-1805781"/>
+            <a:ext cx="8229600" cy="5237018"/>
+          </a:xfrm>
+          <a:prstGeom prst="rect">
+            <a:avLst/>
+          </a:prstGeom>
+        </p:spPr>
+      </p:pic>
     </p:spTree>
     <p:extLst>
       <p:ext uri="{BB962C8B-B14F-4D97-AF65-F5344CB8AC3E}">
-        <p14:creationId xmlns:p14="http://schemas.microsoft.com/office/powerpoint/2010/main" val="11426030"/>
+        <p14:creationId xmlns:p14="http://schemas.microsoft.com/office/powerpoint/2010/main" val="1856490736"/>
       </p:ext>
     </p:extLst>
   </p:cSld>

</xml_diff>